<commit_message>
MAJ de certaines images
</commit_message>
<xml_diff>
--- a/docs/xr_attraper/xr_attraper.pptx
+++ b/docs/xr_attraper/xr_attraper.pptx
@@ -105,13 +105,18 @@
       </a:defRPr>
     </a:lvl9pPr>
   </p:defaultTextStyle>
+  <p:extLst>
+    <p:ext uri="{EFAFB233-063F-42B5-8137-9DF3F51BA10A}">
+      <p15:sldGuideLst xmlns:p15="http://schemas.microsoft.com/office/powerpoint/2012/main"/>
+    </p:ext>
+  </p:extLst>
 </p:presentation>
 </file>
 
 <file path=ppt/revisionInfo.xml><?xml version="1.0" encoding="utf-8"?>
 <p1510:revInfo xmlns:a="http://schemas.openxmlformats.org/drawingml/2006/main" xmlns:r="http://schemas.openxmlformats.org/officeDocument/2006/relationships" xmlns:p1510="http://schemas.microsoft.com/office/powerpoint/2015/10/main">
   <p1510:revLst>
-    <p1510:client id="{7EE4016B-CD79-4BAD-98A1-1495ECD01BA7}" v="9" dt="2022-11-09T00:04:13.930"/>
+    <p1510:client id="{7EE4016B-CD79-4BAD-98A1-1495ECD01BA7}" v="15" dt="2022-11-10T21:06:00.834"/>
   </p1510:revLst>
 </p1510:revInfo>
 </file>
@@ -121,12 +126,12 @@
   <pc:docChgLst>
     <pc:chgData name="Thomas O Fredericks" userId="9a40f032a9b16fc7" providerId="LiveId" clId="{7EE4016B-CD79-4BAD-98A1-1495ECD01BA7}"/>
     <pc:docChg chg="undo custSel addSld modSld">
-      <pc:chgData name="Thomas O Fredericks" userId="9a40f032a9b16fc7" providerId="LiveId" clId="{7EE4016B-CD79-4BAD-98A1-1495ECD01BA7}" dt="2022-11-09T00:04:19.005" v="23" actId="14100"/>
+      <pc:chgData name="Thomas O Fredericks" userId="9a40f032a9b16fc7" providerId="LiveId" clId="{7EE4016B-CD79-4BAD-98A1-1495ECD01BA7}" dt="2022-11-10T21:06:06.451" v="40" actId="14100"/>
       <pc:docMkLst>
         <pc:docMk/>
       </pc:docMkLst>
       <pc:sldChg chg="addSp delSp modSp">
-        <pc:chgData name="Thomas O Fredericks" userId="9a40f032a9b16fc7" providerId="LiveId" clId="{7EE4016B-CD79-4BAD-98A1-1495ECD01BA7}" dt="2022-11-09T00:03:24.844" v="18" actId="14100"/>
+        <pc:chgData name="Thomas O Fredericks" userId="9a40f032a9b16fc7" providerId="LiveId" clId="{7EE4016B-CD79-4BAD-98A1-1495ECD01BA7}" dt="2022-11-10T21:05:55.203" v="34" actId="20577"/>
         <pc:sldMkLst>
           <pc:docMk/>
           <pc:sldMk cId="109893179" sldId="257"/>
@@ -163,6 +168,30 @@
             <ac:spMk id="7" creationId="{4D59A185-4318-4BAC-B736-DC7A452ADD75}"/>
           </ac:spMkLst>
         </pc:spChg>
+        <pc:spChg chg="add mod">
+          <ac:chgData name="Thomas O Fredericks" userId="9a40f032a9b16fc7" providerId="LiveId" clId="{7EE4016B-CD79-4BAD-98A1-1495ECD01BA7}" dt="2022-11-10T21:05:31.908" v="27" actId="1076"/>
+          <ac:spMkLst>
+            <pc:docMk/>
+            <pc:sldMk cId="109893179" sldId="257"/>
+            <ac:spMk id="8" creationId="{B66116F1-AE63-4014-A4D8-69884BC868B9}"/>
+          </ac:spMkLst>
+        </pc:spChg>
+        <pc:spChg chg="add mod">
+          <ac:chgData name="Thomas O Fredericks" userId="9a40f032a9b16fc7" providerId="LiveId" clId="{7EE4016B-CD79-4BAD-98A1-1495ECD01BA7}" dt="2022-11-10T21:05:49.107" v="31" actId="1076"/>
+          <ac:spMkLst>
+            <pc:docMk/>
+            <pc:sldMk cId="109893179" sldId="257"/>
+            <ac:spMk id="9" creationId="{7429C954-26BE-4A7F-9B00-A99169CDA1FD}"/>
+          </ac:spMkLst>
+        </pc:spChg>
+        <pc:spChg chg="add mod">
+          <ac:chgData name="Thomas O Fredericks" userId="9a40f032a9b16fc7" providerId="LiveId" clId="{7EE4016B-CD79-4BAD-98A1-1495ECD01BA7}" dt="2022-11-10T21:05:55.203" v="34" actId="20577"/>
+          <ac:spMkLst>
+            <pc:docMk/>
+            <pc:sldMk cId="109893179" sldId="257"/>
+            <ac:spMk id="10" creationId="{E4C36A12-686D-4CC9-90B1-2D9AED791E97}"/>
+          </ac:spMkLst>
+        </pc:spChg>
         <pc:picChg chg="del">
           <ac:chgData name="Thomas O Fredericks" userId="9a40f032a9b16fc7" providerId="LiveId" clId="{7EE4016B-CD79-4BAD-98A1-1495ECD01BA7}" dt="2022-11-09T00:02:48.308" v="0" actId="478"/>
           <ac:picMkLst>
@@ -181,17 +210,41 @@
         </pc:picChg>
       </pc:sldChg>
       <pc:sldChg chg="addSp modSp add">
-        <pc:chgData name="Thomas O Fredericks" userId="9a40f032a9b16fc7" providerId="LiveId" clId="{7EE4016B-CD79-4BAD-98A1-1495ECD01BA7}" dt="2022-11-09T00:04:19.005" v="23" actId="14100"/>
+        <pc:chgData name="Thomas O Fredericks" userId="9a40f032a9b16fc7" providerId="LiveId" clId="{7EE4016B-CD79-4BAD-98A1-1495ECD01BA7}" dt="2022-11-10T21:06:06.451" v="40" actId="14100"/>
         <pc:sldMkLst>
           <pc:docMk/>
           <pc:sldMk cId="3712491278" sldId="258"/>
         </pc:sldMkLst>
         <pc:spChg chg="add mod">
-          <ac:chgData name="Thomas O Fredericks" userId="9a40f032a9b16fc7" providerId="LiveId" clId="{7EE4016B-CD79-4BAD-98A1-1495ECD01BA7}" dt="2022-11-09T00:04:19.005" v="23" actId="14100"/>
+          <ac:chgData name="Thomas O Fredericks" userId="9a40f032a9b16fc7" providerId="LiveId" clId="{7EE4016B-CD79-4BAD-98A1-1495ECD01BA7}" dt="2022-11-10T21:06:06.451" v="40" actId="14100"/>
           <ac:spMkLst>
             <pc:docMk/>
             <pc:sldMk cId="3712491278" sldId="258"/>
             <ac:spMk id="3" creationId="{3AF6E2BF-FB4B-4A25-ACF1-C1F20A73C97B}"/>
+          </ac:spMkLst>
+        </pc:spChg>
+        <pc:spChg chg="add mod">
+          <ac:chgData name="Thomas O Fredericks" userId="9a40f032a9b16fc7" providerId="LiveId" clId="{7EE4016B-CD79-4BAD-98A1-1495ECD01BA7}" dt="2022-11-10T21:05:14.836" v="25" actId="1076"/>
+          <ac:spMkLst>
+            <pc:docMk/>
+            <pc:sldMk cId="3712491278" sldId="258"/>
+            <ac:spMk id="4" creationId="{755E9FE5-68B8-4838-B808-DB518EE6A290}"/>
+          </ac:spMkLst>
+        </pc:spChg>
+        <pc:spChg chg="add mod">
+          <ac:chgData name="Thomas O Fredericks" userId="9a40f032a9b16fc7" providerId="LiveId" clId="{7EE4016B-CD79-4BAD-98A1-1495ECD01BA7}" dt="2022-11-10T21:06:00.483" v="36" actId="1076"/>
+          <ac:spMkLst>
+            <pc:docMk/>
+            <pc:sldMk cId="3712491278" sldId="258"/>
+            <ac:spMk id="5" creationId="{DB703E5A-0F80-4783-8402-5C16D33D4833}"/>
+          </ac:spMkLst>
+        </pc:spChg>
+        <pc:spChg chg="add mod">
+          <ac:chgData name="Thomas O Fredericks" userId="9a40f032a9b16fc7" providerId="LiveId" clId="{7EE4016B-CD79-4BAD-98A1-1495ECD01BA7}" dt="2022-11-10T21:06:04.049" v="39" actId="20577"/>
+          <ac:spMkLst>
+            <pc:docMk/>
+            <pc:sldMk cId="3712491278" sldId="258"/>
+            <ac:spMk id="6" creationId="{6E22679D-83E0-4560-AD69-B6A9A44E0240}"/>
           </ac:spMkLst>
         </pc:spChg>
         <pc:picChg chg="add">
@@ -357,7 +410,7 @@
           <a:p>
             <a:fld id="{555770D9-476C-45A3-BEE3-B6E5D5F21CF4}" type="datetimeFigureOut">
               <a:rPr lang="fr-CA" smtClean="0"/>
-              <a:t>2022-11-08</a:t>
+              <a:t>2022-11-10</a:t>
             </a:fld>
             <a:endParaRPr lang="fr-CA"/>
           </a:p>
@@ -557,7 +610,7 @@
           <a:p>
             <a:fld id="{555770D9-476C-45A3-BEE3-B6E5D5F21CF4}" type="datetimeFigureOut">
               <a:rPr lang="fr-CA" smtClean="0"/>
-              <a:t>2022-11-08</a:t>
+              <a:t>2022-11-10</a:t>
             </a:fld>
             <a:endParaRPr lang="fr-CA"/>
           </a:p>
@@ -767,7 +820,7 @@
           <a:p>
             <a:fld id="{555770D9-476C-45A3-BEE3-B6E5D5F21CF4}" type="datetimeFigureOut">
               <a:rPr lang="fr-CA" smtClean="0"/>
-              <a:t>2022-11-08</a:t>
+              <a:t>2022-11-10</a:t>
             </a:fld>
             <a:endParaRPr lang="fr-CA"/>
           </a:p>
@@ -967,7 +1020,7 @@
           <a:p>
             <a:fld id="{555770D9-476C-45A3-BEE3-B6E5D5F21CF4}" type="datetimeFigureOut">
               <a:rPr lang="fr-CA" smtClean="0"/>
-              <a:t>2022-11-08</a:t>
+              <a:t>2022-11-10</a:t>
             </a:fld>
             <a:endParaRPr lang="fr-CA"/>
           </a:p>
@@ -1243,7 +1296,7 @@
           <a:p>
             <a:fld id="{555770D9-476C-45A3-BEE3-B6E5D5F21CF4}" type="datetimeFigureOut">
               <a:rPr lang="fr-CA" smtClean="0"/>
-              <a:t>2022-11-08</a:t>
+              <a:t>2022-11-10</a:t>
             </a:fld>
             <a:endParaRPr lang="fr-CA"/>
           </a:p>
@@ -1511,7 +1564,7 @@
           <a:p>
             <a:fld id="{555770D9-476C-45A3-BEE3-B6E5D5F21CF4}" type="datetimeFigureOut">
               <a:rPr lang="fr-CA" smtClean="0"/>
-              <a:t>2022-11-08</a:t>
+              <a:t>2022-11-10</a:t>
             </a:fld>
             <a:endParaRPr lang="fr-CA"/>
           </a:p>
@@ -1926,7 +1979,7 @@
           <a:p>
             <a:fld id="{555770D9-476C-45A3-BEE3-B6E5D5F21CF4}" type="datetimeFigureOut">
               <a:rPr lang="fr-CA" smtClean="0"/>
-              <a:t>2022-11-08</a:t>
+              <a:t>2022-11-10</a:t>
             </a:fld>
             <a:endParaRPr lang="fr-CA"/>
           </a:p>
@@ -2068,7 +2121,7 @@
           <a:p>
             <a:fld id="{555770D9-476C-45A3-BEE3-B6E5D5F21CF4}" type="datetimeFigureOut">
               <a:rPr lang="fr-CA" smtClean="0"/>
-              <a:t>2022-11-08</a:t>
+              <a:t>2022-11-10</a:t>
             </a:fld>
             <a:endParaRPr lang="fr-CA"/>
           </a:p>
@@ -2181,7 +2234,7 @@
           <a:p>
             <a:fld id="{555770D9-476C-45A3-BEE3-B6E5D5F21CF4}" type="datetimeFigureOut">
               <a:rPr lang="fr-CA" smtClean="0"/>
-              <a:t>2022-11-08</a:t>
+              <a:t>2022-11-10</a:t>
             </a:fld>
             <a:endParaRPr lang="fr-CA"/>
           </a:p>
@@ -2494,7 +2547,7 @@
           <a:p>
             <a:fld id="{555770D9-476C-45A3-BEE3-B6E5D5F21CF4}" type="datetimeFigureOut">
               <a:rPr lang="fr-CA" smtClean="0"/>
-              <a:t>2022-11-08</a:t>
+              <a:t>2022-11-10</a:t>
             </a:fld>
             <a:endParaRPr lang="fr-CA"/>
           </a:p>
@@ -2783,7 +2836,7 @@
           <a:p>
             <a:fld id="{555770D9-476C-45A3-BEE3-B6E5D5F21CF4}" type="datetimeFigureOut">
               <a:rPr lang="fr-CA" smtClean="0"/>
-              <a:t>2022-11-08</a:t>
+              <a:t>2022-11-10</a:t>
             </a:fld>
             <a:endParaRPr lang="fr-CA"/>
           </a:p>
@@ -3026,7 +3079,7 @@
           <a:p>
             <a:fld id="{555770D9-476C-45A3-BEE3-B6E5D5F21CF4}" type="datetimeFigureOut">
               <a:rPr lang="fr-CA" smtClean="0"/>
-              <a:t>2022-11-08</a:t>
+              <a:t>2022-11-10</a:t>
             </a:fld>
             <a:endParaRPr lang="fr-CA"/>
           </a:p>
@@ -3681,6 +3734,162 @@
           </a:p>
         </p:txBody>
       </p:sp>
+      <p:sp>
+        <p:nvSpPr>
+          <p:cNvPr id="8" name="Ellipse 7">
+            <a:extLst>
+              <a:ext uri="{FF2B5EF4-FFF2-40B4-BE49-F238E27FC236}">
+                <a16:creationId xmlns:a16="http://schemas.microsoft.com/office/drawing/2014/main" id="{B66116F1-AE63-4014-A4D8-69884BC868B9}"/>
+              </a:ext>
+            </a:extLst>
+          </p:cNvPr>
+          <p:cNvSpPr/>
+          <p:nvPr/>
+        </p:nvSpPr>
+        <p:spPr>
+          <a:xfrm>
+            <a:off x="5718112" y="1068426"/>
+            <a:ext cx="377888" cy="377888"/>
+          </a:xfrm>
+          <a:prstGeom prst="ellipse">
+            <a:avLst/>
+          </a:prstGeom>
+          <a:ln>
+            <a:noFill/>
+          </a:ln>
+        </p:spPr>
+        <p:style>
+          <a:lnRef idx="2">
+            <a:schemeClr val="accent1">
+              <a:shade val="50000"/>
+            </a:schemeClr>
+          </a:lnRef>
+          <a:fillRef idx="1">
+            <a:schemeClr val="accent1"/>
+          </a:fillRef>
+          <a:effectRef idx="0">
+            <a:schemeClr val="accent1"/>
+          </a:effectRef>
+          <a:fontRef idx="minor">
+            <a:schemeClr val="lt1"/>
+          </a:fontRef>
+        </p:style>
+        <p:txBody>
+          <a:bodyPr rtlCol="0" anchor="ctr"/>
+          <a:lstStyle/>
+          <a:p>
+            <a:pPr algn="ctr"/>
+            <a:r>
+              <a:rPr lang="fr-CA" dirty="0"/>
+              <a:t>1</a:t>
+            </a:r>
+          </a:p>
+        </p:txBody>
+      </p:sp>
+      <p:sp>
+        <p:nvSpPr>
+          <p:cNvPr id="9" name="Ellipse 8">
+            <a:extLst>
+              <a:ext uri="{FF2B5EF4-FFF2-40B4-BE49-F238E27FC236}">
+                <a16:creationId xmlns:a16="http://schemas.microsoft.com/office/drawing/2014/main" id="{7429C954-26BE-4A7F-9B00-A99169CDA1FD}"/>
+              </a:ext>
+            </a:extLst>
+          </p:cNvPr>
+          <p:cNvSpPr/>
+          <p:nvPr/>
+        </p:nvSpPr>
+        <p:spPr>
+          <a:xfrm>
+            <a:off x="8024030" y="2066053"/>
+            <a:ext cx="377888" cy="377888"/>
+          </a:xfrm>
+          <a:prstGeom prst="ellipse">
+            <a:avLst/>
+          </a:prstGeom>
+          <a:ln>
+            <a:noFill/>
+          </a:ln>
+        </p:spPr>
+        <p:style>
+          <a:lnRef idx="2">
+            <a:schemeClr val="accent1">
+              <a:shade val="50000"/>
+            </a:schemeClr>
+          </a:lnRef>
+          <a:fillRef idx="1">
+            <a:schemeClr val="accent1"/>
+          </a:fillRef>
+          <a:effectRef idx="0">
+            <a:schemeClr val="accent1"/>
+          </a:effectRef>
+          <a:fontRef idx="minor">
+            <a:schemeClr val="lt1"/>
+          </a:fontRef>
+        </p:style>
+        <p:txBody>
+          <a:bodyPr rtlCol="0" anchor="ctr"/>
+          <a:lstStyle/>
+          <a:p>
+            <a:pPr algn="ctr"/>
+            <a:r>
+              <a:rPr lang="fr-CA" dirty="0"/>
+              <a:t>2</a:t>
+            </a:r>
+          </a:p>
+        </p:txBody>
+      </p:sp>
+      <p:sp>
+        <p:nvSpPr>
+          <p:cNvPr id="10" name="Ellipse 9">
+            <a:extLst>
+              <a:ext uri="{FF2B5EF4-FFF2-40B4-BE49-F238E27FC236}">
+                <a16:creationId xmlns:a16="http://schemas.microsoft.com/office/drawing/2014/main" id="{E4C36A12-686D-4CC9-90B1-2D9AED791E97}"/>
+              </a:ext>
+            </a:extLst>
+          </p:cNvPr>
+          <p:cNvSpPr/>
+          <p:nvPr/>
+        </p:nvSpPr>
+        <p:spPr>
+          <a:xfrm>
+            <a:off x="10522005" y="1101677"/>
+            <a:ext cx="377888" cy="377888"/>
+          </a:xfrm>
+          <a:prstGeom prst="ellipse">
+            <a:avLst/>
+          </a:prstGeom>
+          <a:ln>
+            <a:noFill/>
+          </a:ln>
+        </p:spPr>
+        <p:style>
+          <a:lnRef idx="2">
+            <a:schemeClr val="accent1">
+              <a:shade val="50000"/>
+            </a:schemeClr>
+          </a:lnRef>
+          <a:fillRef idx="1">
+            <a:schemeClr val="accent1"/>
+          </a:fillRef>
+          <a:effectRef idx="0">
+            <a:schemeClr val="accent1"/>
+          </a:effectRef>
+          <a:fontRef idx="minor">
+            <a:schemeClr val="lt1"/>
+          </a:fontRef>
+        </p:style>
+        <p:txBody>
+          <a:bodyPr rtlCol="0" anchor="ctr"/>
+          <a:lstStyle/>
+          <a:p>
+            <a:pPr algn="ctr"/>
+            <a:r>
+              <a:rPr lang="fr-CA" dirty="0"/>
+              <a:t>3</a:t>
+            </a:r>
+          </a:p>
+        </p:txBody>
+      </p:sp>
     </p:spTree>
     <p:extLst>
       <p:ext uri="{BB962C8B-B14F-4D97-AF65-F5344CB8AC3E}">
@@ -3759,6 +3968,60 @@
             <a:ext cx="2840201" cy="3776564"/>
           </a:xfrm>
           <a:prstGeom prst="roundRect">
+            <a:avLst>
+              <a:gd name="adj" fmla="val 6423"/>
+            </a:avLst>
+          </a:prstGeom>
+          <a:noFill/>
+          <a:ln w="38100">
+            <a:solidFill>
+              <a:schemeClr val="accent1"/>
+            </a:solidFill>
+          </a:ln>
+        </p:spPr>
+        <p:style>
+          <a:lnRef idx="2">
+            <a:schemeClr val="accent1">
+              <a:shade val="50000"/>
+            </a:schemeClr>
+          </a:lnRef>
+          <a:fillRef idx="1">
+            <a:schemeClr val="accent1"/>
+          </a:fillRef>
+          <a:effectRef idx="0">
+            <a:schemeClr val="accent1"/>
+          </a:effectRef>
+          <a:fontRef idx="minor">
+            <a:schemeClr val="lt1"/>
+          </a:fontRef>
+        </p:style>
+        <p:txBody>
+          <a:bodyPr rtlCol="0" anchor="ctr"/>
+          <a:lstStyle/>
+          <a:p>
+            <a:pPr algn="ctr"/>
+            <a:endParaRPr lang="fr-CA"/>
+          </a:p>
+        </p:txBody>
+      </p:sp>
+      <p:sp>
+        <p:nvSpPr>
+          <p:cNvPr id="4" name="Rectangle : coins arrondis 3">
+            <a:extLst>
+              <a:ext uri="{FF2B5EF4-FFF2-40B4-BE49-F238E27FC236}">
+                <a16:creationId xmlns:a16="http://schemas.microsoft.com/office/drawing/2014/main" id="{755E9FE5-68B8-4838-B808-DB518EE6A290}"/>
+              </a:ext>
+            </a:extLst>
+          </p:cNvPr>
+          <p:cNvSpPr/>
+          <p:nvPr/>
+        </p:nvSpPr>
+        <p:spPr>
+          <a:xfrm>
+            <a:off x="4026129" y="1698753"/>
+            <a:ext cx="1925783" cy="225487"/>
+          </a:xfrm>
+          <a:prstGeom prst="roundRect">
             <a:avLst/>
           </a:prstGeom>
           <a:noFill/>
@@ -3790,6 +4053,110 @@
           <a:p>
             <a:pPr algn="ctr"/>
             <a:endParaRPr lang="fr-CA"/>
+          </a:p>
+        </p:txBody>
+      </p:sp>
+      <p:sp>
+        <p:nvSpPr>
+          <p:cNvPr id="5" name="Ellipse 4">
+            <a:extLst>
+              <a:ext uri="{FF2B5EF4-FFF2-40B4-BE49-F238E27FC236}">
+                <a16:creationId xmlns:a16="http://schemas.microsoft.com/office/drawing/2014/main" id="{DB703E5A-0F80-4783-8402-5C16D33D4833}"/>
+              </a:ext>
+            </a:extLst>
+          </p:cNvPr>
+          <p:cNvSpPr/>
+          <p:nvPr/>
+        </p:nvSpPr>
+        <p:spPr>
+          <a:xfrm>
+            <a:off x="5762968" y="1622552"/>
+            <a:ext cx="377888" cy="377888"/>
+          </a:xfrm>
+          <a:prstGeom prst="ellipse">
+            <a:avLst/>
+          </a:prstGeom>
+          <a:ln>
+            <a:noFill/>
+          </a:ln>
+        </p:spPr>
+        <p:style>
+          <a:lnRef idx="2">
+            <a:schemeClr val="accent1">
+              <a:shade val="50000"/>
+            </a:schemeClr>
+          </a:lnRef>
+          <a:fillRef idx="1">
+            <a:schemeClr val="accent1"/>
+          </a:fillRef>
+          <a:effectRef idx="0">
+            <a:schemeClr val="accent1"/>
+          </a:effectRef>
+          <a:fontRef idx="minor">
+            <a:schemeClr val="lt1"/>
+          </a:fontRef>
+        </p:style>
+        <p:txBody>
+          <a:bodyPr rtlCol="0" anchor="ctr"/>
+          <a:lstStyle/>
+          <a:p>
+            <a:pPr algn="ctr"/>
+            <a:r>
+              <a:rPr lang="fr-CA" dirty="0"/>
+              <a:t>1</a:t>
+            </a:r>
+          </a:p>
+        </p:txBody>
+      </p:sp>
+      <p:sp>
+        <p:nvSpPr>
+          <p:cNvPr id="6" name="Ellipse 5">
+            <a:extLst>
+              <a:ext uri="{FF2B5EF4-FFF2-40B4-BE49-F238E27FC236}">
+                <a16:creationId xmlns:a16="http://schemas.microsoft.com/office/drawing/2014/main" id="{6E22679D-83E0-4560-AD69-B6A9A44E0240}"/>
+              </a:ext>
+            </a:extLst>
+          </p:cNvPr>
+          <p:cNvSpPr/>
+          <p:nvPr/>
+        </p:nvSpPr>
+        <p:spPr>
+          <a:xfrm>
+            <a:off x="7012648" y="2241684"/>
+            <a:ext cx="377888" cy="377888"/>
+          </a:xfrm>
+          <a:prstGeom prst="ellipse">
+            <a:avLst/>
+          </a:prstGeom>
+          <a:ln>
+            <a:noFill/>
+          </a:ln>
+        </p:spPr>
+        <p:style>
+          <a:lnRef idx="2">
+            <a:schemeClr val="accent1">
+              <a:shade val="50000"/>
+            </a:schemeClr>
+          </a:lnRef>
+          <a:fillRef idx="1">
+            <a:schemeClr val="accent1"/>
+          </a:fillRef>
+          <a:effectRef idx="0">
+            <a:schemeClr val="accent1"/>
+          </a:effectRef>
+          <a:fontRef idx="minor">
+            <a:schemeClr val="lt1"/>
+          </a:fontRef>
+        </p:style>
+        <p:txBody>
+          <a:bodyPr rtlCol="0" anchor="ctr"/>
+          <a:lstStyle/>
+          <a:p>
+            <a:pPr algn="ctr"/>
+            <a:r>
+              <a:rPr lang="fr-CA" dirty="0"/>
+              <a:t>2</a:t>
+            </a:r>
           </a:p>
         </p:txBody>
       </p:sp>

</xml_diff>